<commit_message>
Updated names and test protocol
</commit_message>
<xml_diff>
--- a/repository/CTSCPMAUTO/Illustrations.pptx
+++ b/repository/CTSCPMAUTO/Illustrations.pptx
@@ -6,6 +6,7 @@
   </p:sldMasterIdLst>
   <p:sldIdLst>
     <p:sldId id="256" r:id="rId2"/>
+    <p:sldId id="257" r:id="rId3"/>
   </p:sldIdLst>
   <p:sldSz cx="12192000" cy="6858000"/>
   <p:notesSz cx="6858000" cy="9144000"/>
@@ -4110,6 +4111,791 @@
 </p:sld>
 </file>
 
+<file path=ppt/slides/slide2.xml><?xml version="1.0" encoding="utf-8"?>
+<p:sld xmlns:a="http://schemas.openxmlformats.org/drawingml/2006/main" xmlns:r="http://schemas.openxmlformats.org/officeDocument/2006/relationships" xmlns:p="http://schemas.openxmlformats.org/presentationml/2006/main">
+  <p:cSld>
+    <p:spTree>
+      <p:nvGrpSpPr>
+        <p:cNvPr id="1" name=""/>
+        <p:cNvGrpSpPr/>
+        <p:nvPr/>
+      </p:nvGrpSpPr>
+      <p:grpSpPr>
+        <a:xfrm>
+          <a:off x="0" y="0"/>
+          <a:ext cx="0" cy="0"/>
+          <a:chOff x="0" y="0"/>
+          <a:chExt cx="0" cy="0"/>
+        </a:xfrm>
+      </p:grpSpPr>
+      <p:grpSp>
+        <p:nvGrpSpPr>
+          <p:cNvPr id="13" name="Group 12">
+            <a:extLst>
+              <a:ext uri="{FF2B5EF4-FFF2-40B4-BE49-F238E27FC236}">
+                <a16:creationId xmlns:a16="http://schemas.microsoft.com/office/drawing/2014/main" id="{328A2551-23F0-D921-5B36-80FDB5FE6A3F}"/>
+              </a:ext>
+            </a:extLst>
+          </p:cNvPr>
+          <p:cNvGrpSpPr/>
+          <p:nvPr/>
+        </p:nvGrpSpPr>
+        <p:grpSpPr>
+          <a:xfrm>
+            <a:off x="1937363" y="1694628"/>
+            <a:ext cx="5960936" cy="3668680"/>
+            <a:chOff x="2482486" y="1677044"/>
+            <a:chExt cx="5960936" cy="3668680"/>
+          </a:xfrm>
+        </p:grpSpPr>
+        <p:pic>
+          <p:nvPicPr>
+            <p:cNvPr id="6" name="Picture 5">
+              <a:extLst>
+                <a:ext uri="{FF2B5EF4-FFF2-40B4-BE49-F238E27FC236}">
+                  <a16:creationId xmlns:a16="http://schemas.microsoft.com/office/drawing/2014/main" id="{3A2BD923-DE47-4A13-AA4C-893F0DFB8C0C}"/>
+                </a:ext>
+              </a:extLst>
+            </p:cNvPr>
+            <p:cNvPicPr>
+              <a:picLocks noChangeAspect="1"/>
+            </p:cNvPicPr>
+            <p:nvPr/>
+          </p:nvPicPr>
+          <p:blipFill>
+            <a:blip r:embed="rId2"/>
+            <a:stretch>
+              <a:fillRect/>
+            </a:stretch>
+          </p:blipFill>
+          <p:spPr>
+            <a:xfrm>
+              <a:off x="2482486" y="1677044"/>
+              <a:ext cx="5960936" cy="3668680"/>
+            </a:xfrm>
+            <a:prstGeom prst="rect">
+              <a:avLst/>
+            </a:prstGeom>
+          </p:spPr>
+        </p:pic>
+        <p:sp>
+          <p:nvSpPr>
+            <p:cNvPr id="7" name="Rectangle 6">
+              <a:extLst>
+                <a:ext uri="{FF2B5EF4-FFF2-40B4-BE49-F238E27FC236}">
+                  <a16:creationId xmlns:a16="http://schemas.microsoft.com/office/drawing/2014/main" id="{BE0617B1-7292-00BA-30A9-45D297A4A30F}"/>
+                </a:ext>
+              </a:extLst>
+            </p:cNvPr>
+            <p:cNvSpPr/>
+            <p:nvPr/>
+          </p:nvSpPr>
+          <p:spPr>
+            <a:xfrm>
+              <a:off x="3086100" y="1855177"/>
+              <a:ext cx="1063869" cy="325315"/>
+            </a:xfrm>
+            <a:prstGeom prst="rect">
+              <a:avLst/>
+            </a:prstGeom>
+            <a:noFill/>
+            <a:ln>
+              <a:noFill/>
+            </a:ln>
+          </p:spPr>
+          <p:style>
+            <a:lnRef idx="2">
+              <a:schemeClr val="accent1">
+                <a:shade val="50000"/>
+              </a:schemeClr>
+            </a:lnRef>
+            <a:fillRef idx="1">
+              <a:schemeClr val="accent1"/>
+            </a:fillRef>
+            <a:effectRef idx="0">
+              <a:schemeClr val="accent1"/>
+            </a:effectRef>
+            <a:fontRef idx="minor">
+              <a:schemeClr val="lt1"/>
+            </a:fontRef>
+          </p:style>
+          <p:txBody>
+            <a:bodyPr rtlCol="0" anchor="ctr"/>
+            <a:lstStyle/>
+            <a:p>
+              <a:pPr algn="ctr"/>
+              <a:endParaRPr lang="en-DK"/>
+            </a:p>
+          </p:txBody>
+        </p:sp>
+        <p:sp>
+          <p:nvSpPr>
+            <p:cNvPr id="8" name="Rectangle 7">
+              <a:extLst>
+                <a:ext uri="{FF2B5EF4-FFF2-40B4-BE49-F238E27FC236}">
+                  <a16:creationId xmlns:a16="http://schemas.microsoft.com/office/drawing/2014/main" id="{71217DFE-CE1E-3D66-2775-04E14C53BCD6}"/>
+                </a:ext>
+              </a:extLst>
+            </p:cNvPr>
+            <p:cNvSpPr/>
+            <p:nvPr/>
+          </p:nvSpPr>
+          <p:spPr>
+            <a:xfrm>
+              <a:off x="3086100" y="5002823"/>
+              <a:ext cx="1776046" cy="325316"/>
+            </a:xfrm>
+            <a:prstGeom prst="rect">
+              <a:avLst/>
+            </a:prstGeom>
+            <a:noFill/>
+            <a:ln>
+              <a:noFill/>
+            </a:ln>
+          </p:spPr>
+          <p:style>
+            <a:lnRef idx="2">
+              <a:schemeClr val="accent1">
+                <a:shade val="50000"/>
+              </a:schemeClr>
+            </a:lnRef>
+            <a:fillRef idx="1">
+              <a:schemeClr val="accent1"/>
+            </a:fillRef>
+            <a:effectRef idx="0">
+              <a:schemeClr val="accent1"/>
+            </a:effectRef>
+            <a:fontRef idx="minor">
+              <a:schemeClr val="lt1"/>
+            </a:fontRef>
+          </p:style>
+          <p:txBody>
+            <a:bodyPr rtlCol="0" anchor="ctr"/>
+            <a:lstStyle/>
+            <a:p>
+              <a:pPr algn="ctr"/>
+              <a:endParaRPr lang="en-DK"/>
+            </a:p>
+          </p:txBody>
+        </p:sp>
+        <p:sp>
+          <p:nvSpPr>
+            <p:cNvPr id="9" name="Rectangle 8">
+              <a:extLst>
+                <a:ext uri="{FF2B5EF4-FFF2-40B4-BE49-F238E27FC236}">
+                  <a16:creationId xmlns:a16="http://schemas.microsoft.com/office/drawing/2014/main" id="{31BA7B2D-FA3F-C0F7-6D4C-4B8C11D7B37E}"/>
+                </a:ext>
+              </a:extLst>
+            </p:cNvPr>
+            <p:cNvSpPr/>
+            <p:nvPr/>
+          </p:nvSpPr>
+          <p:spPr>
+            <a:xfrm>
+              <a:off x="8132885" y="2066192"/>
+              <a:ext cx="310537" cy="237393"/>
+            </a:xfrm>
+            <a:prstGeom prst="rect">
+              <a:avLst/>
+            </a:prstGeom>
+            <a:noFill/>
+            <a:ln>
+              <a:noFill/>
+            </a:ln>
+          </p:spPr>
+          <p:style>
+            <a:lnRef idx="2">
+              <a:schemeClr val="accent1">
+                <a:shade val="50000"/>
+              </a:schemeClr>
+            </a:lnRef>
+            <a:fillRef idx="1">
+              <a:schemeClr val="accent1"/>
+            </a:fillRef>
+            <a:effectRef idx="0">
+              <a:schemeClr val="accent1"/>
+            </a:effectRef>
+            <a:fontRef idx="minor">
+              <a:schemeClr val="lt1"/>
+            </a:fontRef>
+          </p:style>
+          <p:txBody>
+            <a:bodyPr rtlCol="0" anchor="ctr"/>
+            <a:lstStyle/>
+            <a:p>
+              <a:pPr algn="ctr"/>
+              <a:endParaRPr lang="en-DK"/>
+            </a:p>
+          </p:txBody>
+        </p:sp>
+        <p:sp>
+          <p:nvSpPr>
+            <p:cNvPr id="10" name="Rectangle 9">
+              <a:extLst>
+                <a:ext uri="{FF2B5EF4-FFF2-40B4-BE49-F238E27FC236}">
+                  <a16:creationId xmlns:a16="http://schemas.microsoft.com/office/drawing/2014/main" id="{786769F9-FA36-F5A1-7F4C-1043EC9A78F8}"/>
+                </a:ext>
+              </a:extLst>
+            </p:cNvPr>
+            <p:cNvSpPr/>
+            <p:nvPr/>
+          </p:nvSpPr>
+          <p:spPr>
+            <a:xfrm>
+              <a:off x="6330462" y="3130062"/>
+              <a:ext cx="114300" cy="123092"/>
+            </a:xfrm>
+            <a:prstGeom prst="rect">
+              <a:avLst/>
+            </a:prstGeom>
+            <a:noFill/>
+            <a:ln>
+              <a:noFill/>
+            </a:ln>
+          </p:spPr>
+          <p:style>
+            <a:lnRef idx="2">
+              <a:schemeClr val="accent1">
+                <a:shade val="50000"/>
+              </a:schemeClr>
+            </a:lnRef>
+            <a:fillRef idx="1">
+              <a:schemeClr val="accent1"/>
+            </a:fillRef>
+            <a:effectRef idx="0">
+              <a:schemeClr val="accent1"/>
+            </a:effectRef>
+            <a:fontRef idx="minor">
+              <a:schemeClr val="lt1"/>
+            </a:fontRef>
+          </p:style>
+          <p:txBody>
+            <a:bodyPr rtlCol="0" anchor="ctr"/>
+            <a:lstStyle/>
+            <a:p>
+              <a:pPr algn="ctr"/>
+              <a:endParaRPr lang="en-DK"/>
+            </a:p>
+          </p:txBody>
+        </p:sp>
+        <p:sp>
+          <p:nvSpPr>
+            <p:cNvPr id="11" name="Rectangle 10">
+              <a:extLst>
+                <a:ext uri="{FF2B5EF4-FFF2-40B4-BE49-F238E27FC236}">
+                  <a16:creationId xmlns:a16="http://schemas.microsoft.com/office/drawing/2014/main" id="{37774BCE-02CF-C239-498F-AC66E46759AA}"/>
+                </a:ext>
+              </a:extLst>
+            </p:cNvPr>
+            <p:cNvSpPr/>
+            <p:nvPr/>
+          </p:nvSpPr>
+          <p:spPr>
+            <a:xfrm>
+              <a:off x="6330462" y="3326424"/>
+              <a:ext cx="114300" cy="123092"/>
+            </a:xfrm>
+            <a:prstGeom prst="rect">
+              <a:avLst/>
+            </a:prstGeom>
+            <a:noFill/>
+            <a:ln>
+              <a:noFill/>
+            </a:ln>
+          </p:spPr>
+          <p:style>
+            <a:lnRef idx="2">
+              <a:schemeClr val="accent1">
+                <a:shade val="50000"/>
+              </a:schemeClr>
+            </a:lnRef>
+            <a:fillRef idx="1">
+              <a:schemeClr val="accent1"/>
+            </a:fillRef>
+            <a:effectRef idx="0">
+              <a:schemeClr val="accent1"/>
+            </a:effectRef>
+            <a:fontRef idx="minor">
+              <a:schemeClr val="lt1"/>
+            </a:fontRef>
+          </p:style>
+          <p:txBody>
+            <a:bodyPr rtlCol="0" anchor="ctr"/>
+            <a:lstStyle/>
+            <a:p>
+              <a:pPr algn="ctr"/>
+              <a:endParaRPr lang="en-DK"/>
+            </a:p>
+          </p:txBody>
+        </p:sp>
+        <p:sp>
+          <p:nvSpPr>
+            <p:cNvPr id="12" name="Rectangle 11">
+              <a:extLst>
+                <a:ext uri="{FF2B5EF4-FFF2-40B4-BE49-F238E27FC236}">
+                  <a16:creationId xmlns:a16="http://schemas.microsoft.com/office/drawing/2014/main" id="{1B7E752B-D754-4345-8084-C1994315D412}"/>
+                </a:ext>
+              </a:extLst>
+            </p:cNvPr>
+            <p:cNvSpPr/>
+            <p:nvPr/>
+          </p:nvSpPr>
+          <p:spPr>
+            <a:xfrm>
+              <a:off x="6330462" y="3786555"/>
+              <a:ext cx="114300" cy="123092"/>
+            </a:xfrm>
+            <a:prstGeom prst="rect">
+              <a:avLst/>
+            </a:prstGeom>
+            <a:noFill/>
+            <a:ln>
+              <a:noFill/>
+            </a:ln>
+          </p:spPr>
+          <p:style>
+            <a:lnRef idx="2">
+              <a:schemeClr val="accent1">
+                <a:shade val="50000"/>
+              </a:schemeClr>
+            </a:lnRef>
+            <a:fillRef idx="1">
+              <a:schemeClr val="accent1"/>
+            </a:fillRef>
+            <a:effectRef idx="0">
+              <a:schemeClr val="accent1"/>
+            </a:effectRef>
+            <a:fontRef idx="minor">
+              <a:schemeClr val="lt1"/>
+            </a:fontRef>
+          </p:style>
+          <p:txBody>
+            <a:bodyPr rtlCol="0" anchor="ctr"/>
+            <a:lstStyle/>
+            <a:p>
+              <a:pPr algn="ctr"/>
+              <a:endParaRPr lang="en-DK"/>
+            </a:p>
+          </p:txBody>
+        </p:sp>
+      </p:grpSp>
+      <p:sp>
+        <p:nvSpPr>
+          <p:cNvPr id="14" name="TextBox 13">
+            <a:extLst>
+              <a:ext uri="{FF2B5EF4-FFF2-40B4-BE49-F238E27FC236}">
+                <a16:creationId xmlns:a16="http://schemas.microsoft.com/office/drawing/2014/main" id="{F8753018-B73E-8764-C59A-4218E60C2ABD}"/>
+              </a:ext>
+            </a:extLst>
+          </p:cNvPr>
+          <p:cNvSpPr txBox="1"/>
+          <p:nvPr/>
+        </p:nvSpPr>
+        <p:spPr>
+          <a:xfrm>
+            <a:off x="4106008" y="975946"/>
+            <a:ext cx="3506794" cy="369332"/>
+          </a:xfrm>
+          <a:prstGeom prst="rect">
+            <a:avLst/>
+          </a:prstGeom>
+          <a:noFill/>
+        </p:spPr>
+        <p:txBody>
+          <a:bodyPr wrap="none" rtlCol="0">
+            <a:spAutoFit/>
+          </a:bodyPr>
+          <a:lstStyle/>
+          <a:p>
+            <a:r>
+              <a:rPr lang="en-GB" dirty="0"/>
+              <a:t>1. Select the labbench.io repository</a:t>
+            </a:r>
+            <a:endParaRPr lang="en-DK" dirty="0"/>
+          </a:p>
+        </p:txBody>
+      </p:sp>
+      <p:sp>
+        <p:nvSpPr>
+          <p:cNvPr id="15" name="TextBox 14">
+            <a:extLst>
+              <a:ext uri="{FF2B5EF4-FFF2-40B4-BE49-F238E27FC236}">
+                <a16:creationId xmlns:a16="http://schemas.microsoft.com/office/drawing/2014/main" id="{BA8845B9-FDA1-8A54-8073-3074B36A1827}"/>
+              </a:ext>
+            </a:extLst>
+          </p:cNvPr>
+          <p:cNvSpPr txBox="1"/>
+          <p:nvPr/>
+        </p:nvSpPr>
+        <p:spPr>
+          <a:xfrm>
+            <a:off x="4317023" y="5558888"/>
+            <a:ext cx="6380284" cy="646331"/>
+          </a:xfrm>
+          <a:prstGeom prst="rect">
+            <a:avLst/>
+          </a:prstGeom>
+          <a:noFill/>
+        </p:spPr>
+        <p:txBody>
+          <a:bodyPr wrap="square" rtlCol="0">
+            <a:spAutoFit/>
+          </a:bodyPr>
+          <a:lstStyle/>
+          <a:p>
+            <a:r>
+              <a:rPr lang="en-GB" dirty="0"/>
+              <a:t>2. Select the “Temporal Summation and Conditioned Pain Modulation Protocol (Compressor Test Version)” protocol</a:t>
+            </a:r>
+            <a:endParaRPr lang="en-DK" dirty="0"/>
+          </a:p>
+        </p:txBody>
+      </p:sp>
+      <p:sp>
+        <p:nvSpPr>
+          <p:cNvPr id="16" name="TextBox 15">
+            <a:extLst>
+              <a:ext uri="{FF2B5EF4-FFF2-40B4-BE49-F238E27FC236}">
+                <a16:creationId xmlns:a16="http://schemas.microsoft.com/office/drawing/2014/main" id="{6FDC5B3A-1FA3-BFBD-E69E-0106C0E21DDC}"/>
+              </a:ext>
+            </a:extLst>
+          </p:cNvPr>
+          <p:cNvSpPr txBox="1"/>
+          <p:nvPr/>
+        </p:nvSpPr>
+        <p:spPr>
+          <a:xfrm>
+            <a:off x="8124093" y="2321169"/>
+            <a:ext cx="3200400" cy="646331"/>
+          </a:xfrm>
+          <a:prstGeom prst="rect">
+            <a:avLst/>
+          </a:prstGeom>
+          <a:noFill/>
+        </p:spPr>
+        <p:txBody>
+          <a:bodyPr wrap="square" rtlCol="0">
+            <a:spAutoFit/>
+          </a:bodyPr>
+          <a:lstStyle/>
+          <a:p>
+            <a:r>
+              <a:rPr lang="en-GB" dirty="0"/>
+              <a:t>3. Click the “+” button to install the protocol</a:t>
+            </a:r>
+            <a:endParaRPr lang="en-DK" dirty="0"/>
+          </a:p>
+        </p:txBody>
+      </p:sp>
+      <p:sp>
+        <p:nvSpPr>
+          <p:cNvPr id="17" name="TextBox 16">
+            <a:extLst>
+              <a:ext uri="{FF2B5EF4-FFF2-40B4-BE49-F238E27FC236}">
+                <a16:creationId xmlns:a16="http://schemas.microsoft.com/office/drawing/2014/main" id="{8F85C435-8080-C8C0-36DE-E2202859F338}"/>
+              </a:ext>
+            </a:extLst>
+          </p:cNvPr>
+          <p:cNvSpPr txBox="1"/>
+          <p:nvPr/>
+        </p:nvSpPr>
+        <p:spPr>
+          <a:xfrm>
+            <a:off x="8124093" y="2899284"/>
+            <a:ext cx="3200400" cy="646331"/>
+          </a:xfrm>
+          <a:prstGeom prst="rect">
+            <a:avLst/>
+          </a:prstGeom>
+          <a:noFill/>
+        </p:spPr>
+        <p:txBody>
+          <a:bodyPr wrap="square" rtlCol="0">
+            <a:spAutoFit/>
+          </a:bodyPr>
+          <a:lstStyle/>
+          <a:p>
+            <a:r>
+              <a:rPr lang="en-GB" dirty="0"/>
+              <a:t>4. Give the experiment an ID and a name.</a:t>
+            </a:r>
+            <a:endParaRPr lang="en-DK" dirty="0"/>
+          </a:p>
+        </p:txBody>
+      </p:sp>
+      <p:sp>
+        <p:nvSpPr>
+          <p:cNvPr id="18" name="TextBox 17">
+            <a:extLst>
+              <a:ext uri="{FF2B5EF4-FFF2-40B4-BE49-F238E27FC236}">
+                <a16:creationId xmlns:a16="http://schemas.microsoft.com/office/drawing/2014/main" id="{C1975799-3A3C-6778-A4E8-CA766B3B9A06}"/>
+              </a:ext>
+            </a:extLst>
+          </p:cNvPr>
+          <p:cNvSpPr txBox="1"/>
+          <p:nvPr/>
+        </p:nvSpPr>
+        <p:spPr>
+          <a:xfrm>
+            <a:off x="8124093" y="3681019"/>
+            <a:ext cx="2759410" cy="369332"/>
+          </a:xfrm>
+          <a:prstGeom prst="rect">
+            <a:avLst/>
+          </a:prstGeom>
+          <a:noFill/>
+        </p:spPr>
+        <p:txBody>
+          <a:bodyPr wrap="none" rtlCol="0">
+            <a:spAutoFit/>
+          </a:bodyPr>
+          <a:lstStyle/>
+          <a:p>
+            <a:r>
+              <a:rPr lang="en-GB" dirty="0"/>
+              <a:t>5. Click the “Install” button.</a:t>
+            </a:r>
+            <a:endParaRPr lang="en-DK" dirty="0"/>
+          </a:p>
+        </p:txBody>
+      </p:sp>
+      <p:cxnSp>
+        <p:nvCxnSpPr>
+          <p:cNvPr id="20" name="Connector: Elbow 19">
+            <a:extLst>
+              <a:ext uri="{FF2B5EF4-FFF2-40B4-BE49-F238E27FC236}">
+                <a16:creationId xmlns:a16="http://schemas.microsoft.com/office/drawing/2014/main" id="{4FB018A5-E96C-1434-7FF3-5B3E26DC7C73}"/>
+              </a:ext>
+            </a:extLst>
+          </p:cNvPr>
+          <p:cNvCxnSpPr>
+            <a:stCxn id="14" idx="1"/>
+            <a:endCxn id="7" idx="0"/>
+          </p:cNvCxnSpPr>
+          <p:nvPr/>
+        </p:nvCxnSpPr>
+        <p:spPr>
+          <a:xfrm rot="10800000" flipV="1">
+            <a:off x="3072912" y="1160611"/>
+            <a:ext cx="1033096" cy="712149"/>
+          </a:xfrm>
+          <a:prstGeom prst="bentConnector2">
+            <a:avLst/>
+          </a:prstGeom>
+          <a:ln>
+            <a:solidFill>
+              <a:schemeClr val="tx1"/>
+            </a:solidFill>
+            <a:tailEnd type="triangle"/>
+          </a:ln>
+        </p:spPr>
+        <p:style>
+          <a:lnRef idx="1">
+            <a:schemeClr val="accent1"/>
+          </a:lnRef>
+          <a:fillRef idx="0">
+            <a:schemeClr val="accent1"/>
+          </a:fillRef>
+          <a:effectRef idx="0">
+            <a:schemeClr val="accent1"/>
+          </a:effectRef>
+          <a:fontRef idx="minor">
+            <a:schemeClr val="tx1"/>
+          </a:fontRef>
+        </p:style>
+      </p:cxnSp>
+      <p:cxnSp>
+        <p:nvCxnSpPr>
+          <p:cNvPr id="22" name="Connector: Elbow 21">
+            <a:extLst>
+              <a:ext uri="{FF2B5EF4-FFF2-40B4-BE49-F238E27FC236}">
+                <a16:creationId xmlns:a16="http://schemas.microsoft.com/office/drawing/2014/main" id="{BA3D9B58-E9AA-640F-00B3-12EACC76284F}"/>
+              </a:ext>
+            </a:extLst>
+          </p:cNvPr>
+          <p:cNvCxnSpPr>
+            <a:stCxn id="15" idx="1"/>
+            <a:endCxn id="8" idx="2"/>
+          </p:cNvCxnSpPr>
+          <p:nvPr/>
+        </p:nvCxnSpPr>
+        <p:spPr>
+          <a:xfrm rot="10800000">
+            <a:off x="3429001" y="5345724"/>
+            <a:ext cx="888023" cy="536331"/>
+          </a:xfrm>
+          <a:prstGeom prst="bentConnector2">
+            <a:avLst/>
+          </a:prstGeom>
+          <a:ln>
+            <a:solidFill>
+              <a:schemeClr val="tx1"/>
+            </a:solidFill>
+            <a:tailEnd type="triangle"/>
+          </a:ln>
+        </p:spPr>
+        <p:style>
+          <a:lnRef idx="1">
+            <a:schemeClr val="accent1"/>
+          </a:lnRef>
+          <a:fillRef idx="0">
+            <a:schemeClr val="accent1"/>
+          </a:fillRef>
+          <a:effectRef idx="0">
+            <a:schemeClr val="accent1"/>
+          </a:effectRef>
+          <a:fontRef idx="minor">
+            <a:schemeClr val="tx1"/>
+          </a:fontRef>
+        </p:style>
+      </p:cxnSp>
+      <p:cxnSp>
+        <p:nvCxnSpPr>
+          <p:cNvPr id="24" name="Straight Arrow Connector 23">
+            <a:extLst>
+              <a:ext uri="{FF2B5EF4-FFF2-40B4-BE49-F238E27FC236}">
+                <a16:creationId xmlns:a16="http://schemas.microsoft.com/office/drawing/2014/main" id="{6B6AD65A-EB6E-B4F5-C9C1-29C90DB22DDC}"/>
+              </a:ext>
+            </a:extLst>
+          </p:cNvPr>
+          <p:cNvCxnSpPr>
+            <a:stCxn id="16" idx="1"/>
+          </p:cNvCxnSpPr>
+          <p:nvPr/>
+        </p:nvCxnSpPr>
+        <p:spPr>
+          <a:xfrm flipH="1" flipV="1">
+            <a:off x="7743030" y="2644334"/>
+            <a:ext cx="381063" cy="1"/>
+          </a:xfrm>
+          <a:prstGeom prst="straightConnector1">
+            <a:avLst/>
+          </a:prstGeom>
+          <a:ln>
+            <a:solidFill>
+              <a:schemeClr val="tx1"/>
+            </a:solidFill>
+            <a:tailEnd type="triangle"/>
+          </a:ln>
+        </p:spPr>
+        <p:style>
+          <a:lnRef idx="1">
+            <a:schemeClr val="accent1"/>
+          </a:lnRef>
+          <a:fillRef idx="0">
+            <a:schemeClr val="accent1"/>
+          </a:fillRef>
+          <a:effectRef idx="0">
+            <a:schemeClr val="accent1"/>
+          </a:effectRef>
+          <a:fontRef idx="minor">
+            <a:schemeClr val="tx1"/>
+          </a:fontRef>
+        </p:style>
+      </p:cxnSp>
+      <p:cxnSp>
+        <p:nvCxnSpPr>
+          <p:cNvPr id="26" name="Straight Arrow Connector 25">
+            <a:extLst>
+              <a:ext uri="{FF2B5EF4-FFF2-40B4-BE49-F238E27FC236}">
+                <a16:creationId xmlns:a16="http://schemas.microsoft.com/office/drawing/2014/main" id="{7BE01B12-7E02-B03B-A6B6-49C52870B771}"/>
+              </a:ext>
+            </a:extLst>
+          </p:cNvPr>
+          <p:cNvCxnSpPr>
+            <a:cxnSpLocks/>
+            <a:stCxn id="17" idx="1"/>
+            <a:endCxn id="10" idx="3"/>
+          </p:cNvCxnSpPr>
+          <p:nvPr/>
+        </p:nvCxnSpPr>
+        <p:spPr>
+          <a:xfrm flipH="1" flipV="1">
+            <a:off x="5899639" y="3209192"/>
+            <a:ext cx="2224454" cy="13258"/>
+          </a:xfrm>
+          <a:prstGeom prst="straightConnector1">
+            <a:avLst/>
+          </a:prstGeom>
+          <a:ln>
+            <a:solidFill>
+              <a:schemeClr val="tx1"/>
+            </a:solidFill>
+            <a:tailEnd type="triangle"/>
+          </a:ln>
+        </p:spPr>
+        <p:style>
+          <a:lnRef idx="1">
+            <a:schemeClr val="accent1"/>
+          </a:lnRef>
+          <a:fillRef idx="0">
+            <a:schemeClr val="accent1"/>
+          </a:fillRef>
+          <a:effectRef idx="0">
+            <a:schemeClr val="accent1"/>
+          </a:effectRef>
+          <a:fontRef idx="minor">
+            <a:schemeClr val="tx1"/>
+          </a:fontRef>
+        </p:style>
+      </p:cxnSp>
+      <p:cxnSp>
+        <p:nvCxnSpPr>
+          <p:cNvPr id="29" name="Straight Arrow Connector 28">
+            <a:extLst>
+              <a:ext uri="{FF2B5EF4-FFF2-40B4-BE49-F238E27FC236}">
+                <a16:creationId xmlns:a16="http://schemas.microsoft.com/office/drawing/2014/main" id="{58CD3D1D-E656-71E6-068B-9D940849E525}"/>
+              </a:ext>
+            </a:extLst>
+          </p:cNvPr>
+          <p:cNvCxnSpPr>
+            <a:stCxn id="18" idx="1"/>
+          </p:cNvCxnSpPr>
+          <p:nvPr/>
+        </p:nvCxnSpPr>
+        <p:spPr>
+          <a:xfrm flipH="1">
+            <a:off x="5899639" y="3865685"/>
+            <a:ext cx="2224454" cy="0"/>
+          </a:xfrm>
+          <a:prstGeom prst="straightConnector1">
+            <a:avLst/>
+          </a:prstGeom>
+          <a:ln>
+            <a:solidFill>
+              <a:schemeClr val="tx1"/>
+            </a:solidFill>
+            <a:tailEnd type="triangle"/>
+          </a:ln>
+        </p:spPr>
+        <p:style>
+          <a:lnRef idx="1">
+            <a:schemeClr val="accent1"/>
+          </a:lnRef>
+          <a:fillRef idx="0">
+            <a:schemeClr val="accent1"/>
+          </a:fillRef>
+          <a:effectRef idx="0">
+            <a:schemeClr val="accent1"/>
+          </a:effectRef>
+          <a:fontRef idx="minor">
+            <a:schemeClr val="tx1"/>
+          </a:fontRef>
+        </p:style>
+      </p:cxnSp>
+    </p:spTree>
+    <p:extLst>
+      <p:ext uri="{BB962C8B-B14F-4D97-AF65-F5344CB8AC3E}">
+        <p14:creationId xmlns:p14="http://schemas.microsoft.com/office/powerpoint/2010/main" val="10968451"/>
+      </p:ext>
+    </p:extLst>
+  </p:cSld>
+  <p:clrMapOvr>
+    <a:masterClrMapping/>
+  </p:clrMapOvr>
+</p:sld>
+</file>
+
 <file path=ppt/theme/theme1.xml><?xml version="1.0" encoding="utf-8"?>
 <a:theme xmlns:a="http://schemas.openxmlformats.org/drawingml/2006/main" name="Office Theme">
   <a:themeElements>

</xml_diff>